<commit_message>
updated slides in pop vs attendance
</commit_message>
<xml_diff>
--- a/Slides/Attendance_vs_Population_Slides.pptx
+++ b/Slides/Attendance_vs_Population_Slides.pptx
@@ -472,7 +472,7 @@
           <a:p>
             <a:fld id="{336AF1DC-6748-44E2-BA9D-7822660A96AB}" type="datetimeFigureOut">
               <a:rPr lang="en-US" smtClean="0"/>
-              <a:t>6/2/2019</a:t>
+              <a:t>6/3/2019</a:t>
             </a:fld>
             <a:endParaRPr lang="en-US"/>
           </a:p>
@@ -796,7 +796,7 @@
           <a:p>
             <a:fld id="{336AF1DC-6748-44E2-BA9D-7822660A96AB}" type="datetimeFigureOut">
               <a:rPr lang="en-US" smtClean="0"/>
-              <a:t>6/2/2019</a:t>
+              <a:t>6/3/2019</a:t>
             </a:fld>
             <a:endParaRPr lang="en-US"/>
           </a:p>
@@ -1044,7 +1044,7 @@
           <a:p>
             <a:fld id="{336AF1DC-6748-44E2-BA9D-7822660A96AB}" type="datetimeFigureOut">
               <a:rPr lang="en-US" smtClean="0"/>
-              <a:t>6/2/2019</a:t>
+              <a:t>6/3/2019</a:t>
             </a:fld>
             <a:endParaRPr lang="en-US"/>
           </a:p>
@@ -1383,7 +1383,7 @@
           <a:p>
             <a:fld id="{336AF1DC-6748-44E2-BA9D-7822660A96AB}" type="datetimeFigureOut">
               <a:rPr lang="en-US" smtClean="0"/>
-              <a:t>6/2/2019</a:t>
+              <a:t>6/3/2019</a:t>
             </a:fld>
             <a:endParaRPr lang="en-US"/>
           </a:p>
@@ -1730,7 +1730,7 @@
           <a:p>
             <a:fld id="{336AF1DC-6748-44E2-BA9D-7822660A96AB}" type="datetimeFigureOut">
               <a:rPr lang="en-US" smtClean="0"/>
-              <a:t>6/2/2019</a:t>
+              <a:t>6/3/2019</a:t>
             </a:fld>
             <a:endParaRPr lang="en-US"/>
           </a:p>
@@ -2104,7 +2104,7 @@
           <a:p>
             <a:fld id="{336AF1DC-6748-44E2-BA9D-7822660A96AB}" type="datetimeFigureOut">
               <a:rPr lang="en-US" smtClean="0"/>
-              <a:t>6/2/2019</a:t>
+              <a:t>6/3/2019</a:t>
             </a:fld>
             <a:endParaRPr lang="en-US"/>
           </a:p>
@@ -2574,7 +2574,7 @@
           <a:p>
             <a:fld id="{336AF1DC-6748-44E2-BA9D-7822660A96AB}" type="datetimeFigureOut">
               <a:rPr lang="en-US" smtClean="0"/>
-              <a:t>6/2/2019</a:t>
+              <a:t>6/3/2019</a:t>
             </a:fld>
             <a:endParaRPr lang="en-US"/>
           </a:p>
@@ -2779,7 +2779,7 @@
           <a:p>
             <a:fld id="{336AF1DC-6748-44E2-BA9D-7822660A96AB}" type="datetimeFigureOut">
               <a:rPr lang="en-US" smtClean="0"/>
-              <a:t>6/2/2019</a:t>
+              <a:t>6/3/2019</a:t>
             </a:fld>
             <a:endParaRPr lang="en-US"/>
           </a:p>
@@ -2990,7 +2990,7 @@
           <a:p>
             <a:fld id="{336AF1DC-6748-44E2-BA9D-7822660A96AB}" type="datetimeFigureOut">
               <a:rPr lang="en-US" smtClean="0"/>
-              <a:t>6/2/2019</a:t>
+              <a:t>6/3/2019</a:t>
             </a:fld>
             <a:endParaRPr lang="en-US"/>
           </a:p>
@@ -3222,7 +3222,7 @@
           <a:p>
             <a:fld id="{336AF1DC-6748-44E2-BA9D-7822660A96AB}" type="datetimeFigureOut">
               <a:rPr lang="en-US" smtClean="0"/>
-              <a:t>6/2/2019</a:t>
+              <a:t>6/3/2019</a:t>
             </a:fld>
             <a:endParaRPr lang="en-US"/>
           </a:p>
@@ -3470,7 +3470,7 @@
           <a:p>
             <a:fld id="{336AF1DC-6748-44E2-BA9D-7822660A96AB}" type="datetimeFigureOut">
               <a:rPr lang="en-US" smtClean="0"/>
-              <a:t>6/2/2019</a:t>
+              <a:t>6/3/2019</a:t>
             </a:fld>
             <a:endParaRPr lang="en-US"/>
           </a:p>
@@ -3768,7 +3768,7 @@
           <a:p>
             <a:fld id="{336AF1DC-6748-44E2-BA9D-7822660A96AB}" type="datetimeFigureOut">
               <a:rPr lang="en-US" smtClean="0"/>
-              <a:t>6/2/2019</a:t>
+              <a:t>6/3/2019</a:t>
             </a:fld>
             <a:endParaRPr lang="en-US"/>
           </a:p>
@@ -4162,7 +4162,7 @@
           <a:p>
             <a:fld id="{336AF1DC-6748-44E2-BA9D-7822660A96AB}" type="datetimeFigureOut">
               <a:rPr lang="en-US" smtClean="0"/>
-              <a:t>6/2/2019</a:t>
+              <a:t>6/3/2019</a:t>
             </a:fld>
             <a:endParaRPr lang="en-US"/>
           </a:p>
@@ -4311,7 +4311,7 @@
           <a:p>
             <a:fld id="{336AF1DC-6748-44E2-BA9D-7822660A96AB}" type="datetimeFigureOut">
               <a:rPr lang="en-US" smtClean="0"/>
-              <a:t>6/2/2019</a:t>
+              <a:t>6/3/2019</a:t>
             </a:fld>
             <a:endParaRPr lang="en-US"/>
           </a:p>
@@ -4437,7 +4437,7 @@
           <a:p>
             <a:fld id="{336AF1DC-6748-44E2-BA9D-7822660A96AB}" type="datetimeFigureOut">
               <a:rPr lang="en-US" smtClean="0"/>
-              <a:t>6/2/2019</a:t>
+              <a:t>6/3/2019</a:t>
             </a:fld>
             <a:endParaRPr lang="en-US"/>
           </a:p>
@@ -4692,7 +4692,7 @@
           <a:p>
             <a:fld id="{336AF1DC-6748-44E2-BA9D-7822660A96AB}" type="datetimeFigureOut">
               <a:rPr lang="en-US" smtClean="0"/>
-              <a:t>6/2/2019</a:t>
+              <a:t>6/3/2019</a:t>
             </a:fld>
             <a:endParaRPr lang="en-US"/>
           </a:p>
@@ -5007,7 +5007,7 @@
           <a:p>
             <a:fld id="{336AF1DC-6748-44E2-BA9D-7822660A96AB}" type="datetimeFigureOut">
               <a:rPr lang="en-US" smtClean="0"/>
-              <a:t>6/2/2019</a:t>
+              <a:t>6/3/2019</a:t>
             </a:fld>
             <a:endParaRPr lang="en-US"/>
           </a:p>
@@ -5358,7 +5358,7 @@
           <a:p>
             <a:fld id="{336AF1DC-6748-44E2-BA9D-7822660A96AB}" type="datetimeFigureOut">
               <a:rPr lang="en-US" smtClean="0"/>
-              <a:t>6/2/2019</a:t>
+              <a:t>6/3/2019</a:t>
             </a:fld>
             <a:endParaRPr lang="en-US"/>
           </a:p>
@@ -6252,10 +6252,10 @@
       </p:grpSpPr>
       <p:pic>
         <p:nvPicPr>
-          <p:cNvPr id="13" name="Picture 12" descr="A close up of a map&#10;&#10;Description automatically generated">
+          <p:cNvPr id="3" name="Picture 2" descr="A close up of a map&#10;&#10;Description automatically generated">
             <a:extLst>
               <a:ext uri="{FF2B5EF4-FFF2-40B4-BE49-F238E27FC236}">
-                <a16:creationId xmlns:a16="http://schemas.microsoft.com/office/drawing/2014/main" id="{A3ED9D97-AF88-4ABD-913B-5790113CEC3C}"/>
+                <a16:creationId xmlns:a16="http://schemas.microsoft.com/office/drawing/2014/main" id="{56BC2E78-A3C7-4972-B179-84D0ACC1B680}"/>
               </a:ext>
             </a:extLst>
           </p:cNvPr>
@@ -6278,8 +6278,8 @@
         </p:blipFill>
         <p:spPr>
           <a:xfrm>
-            <a:off x="1753280" y="756557"/>
-            <a:ext cx="8685439" cy="5344886"/>
+            <a:off x="1772875" y="768615"/>
+            <a:ext cx="8646250" cy="5320769"/>
           </a:xfrm>
           <a:prstGeom prst="rect">
             <a:avLst/>
@@ -6367,7 +6367,7 @@
           <a:p>
             <a:r>
               <a:rPr lang="en-US" dirty="0"/>
-              <a:t>There is a moderate correlation (.57) between population and average team attendance.</a:t>
+              <a:t>There is a moderate correlation (.547) between population and average team attendance however there are significant differences in attendance per game between the pairs of teams that exist within the same CSA.</a:t>
             </a:r>
           </a:p>
           <a:p>

</xml_diff>